<commit_message>
actually read for talk.  All tests ignored
</commit_message>
<xml_diff>
--- a/Who Watches the Watchmen Dev Nexus 2020.pptx
+++ b/Who Watches the Watchmen Dev Nexus 2020.pptx
@@ -5,7 +5,7 @@
     <p:sldMasterId id="2147483648" r:id="rId1"/>
   </p:sldMasterIdLst>
   <p:notesMasterIdLst>
-    <p:notesMasterId r:id="rId23"/>
+    <p:notesMasterId r:id="rId25"/>
   </p:notesMasterIdLst>
   <p:sldIdLst>
     <p:sldId id="322" r:id="rId2"/>
@@ -23,12 +23,14 @@
     <p:sldId id="271" r:id="rId14"/>
     <p:sldId id="272" r:id="rId15"/>
     <p:sldId id="274" r:id="rId16"/>
-    <p:sldId id="275" r:id="rId17"/>
-    <p:sldId id="277" r:id="rId18"/>
-    <p:sldId id="278" r:id="rId19"/>
-    <p:sldId id="279" r:id="rId20"/>
-    <p:sldId id="326" r:id="rId21"/>
-    <p:sldId id="280" r:id="rId22"/>
+    <p:sldId id="327" r:id="rId17"/>
+    <p:sldId id="275" r:id="rId18"/>
+    <p:sldId id="328" r:id="rId19"/>
+    <p:sldId id="277" r:id="rId20"/>
+    <p:sldId id="278" r:id="rId21"/>
+    <p:sldId id="279" r:id="rId22"/>
+    <p:sldId id="326" r:id="rId23"/>
+    <p:sldId id="280" r:id="rId24"/>
   </p:sldIdLst>
   <p:sldSz cx="12192000" cy="6858000"/>
   <p:notesSz cx="6858000" cy="9144000"/>
@@ -434,7 +436,7 @@
           <a:p>
             <a:fld id="{CEC7C4CE-0BA7-46C7-910C-86236A29B096}" type="datetimeFigureOut">
               <a:rPr lang="en-US" smtClean="0"/>
-              <a:t>2/20/2020</a:t>
+              <a:t>2/21/2020</a:t>
             </a:fld>
             <a:endParaRPr lang="en-US"/>
           </a:p>
@@ -1046,6 +1048,402 @@
 </p:notes>
 </file>
 
+<file path=ppt/notesSlides/notesSlide13.xml><?xml version="1.0" encoding="utf-8"?>
+<p:notes xmlns:a="http://schemas.openxmlformats.org/drawingml/2006/main" xmlns:r="http://schemas.openxmlformats.org/officeDocument/2006/relationships" xmlns:p="http://schemas.openxmlformats.org/presentationml/2006/main">
+  <p:cSld>
+    <p:spTree>
+      <p:nvGrpSpPr>
+        <p:cNvPr id="1" name=""/>
+        <p:cNvGrpSpPr/>
+        <p:nvPr/>
+      </p:nvGrpSpPr>
+      <p:grpSpPr>
+        <a:xfrm>
+          <a:off x="0" y="0"/>
+          <a:ext cx="0" cy="0"/>
+          <a:chOff x="0" y="0"/>
+          <a:chExt cx="0" cy="0"/>
+        </a:xfrm>
+      </p:grpSpPr>
+      <p:sp>
+        <p:nvSpPr>
+          <p:cNvPr id="2" name="Slide Image Placeholder 1"/>
+          <p:cNvSpPr>
+            <a:spLocks noGrp="1" noRot="1" noChangeAspect="1"/>
+          </p:cNvSpPr>
+          <p:nvPr>
+            <p:ph type="sldImg"/>
+          </p:nvPr>
+        </p:nvSpPr>
+        <p:spPr/>
+      </p:sp>
+      <p:sp>
+        <p:nvSpPr>
+          <p:cNvPr id="3" name="Notes Placeholder 2"/>
+          <p:cNvSpPr>
+            <a:spLocks noGrp="1"/>
+          </p:cNvSpPr>
+          <p:nvPr>
+            <p:ph type="body" idx="1"/>
+          </p:nvPr>
+        </p:nvSpPr>
+        <p:spPr/>
+        <p:txBody>
+          <a:bodyPr/>
+          <a:lstStyle/>
+          <a:p>
+            <a:r>
+              <a:rPr lang="en-US" dirty="0"/>
+              <a:t>Which brings us to mutation testing</a:t>
+            </a:r>
+          </a:p>
+          <a:p>
+            <a:r>
+              <a:rPr lang="en-US" dirty="0"/>
+              <a:t>The idea is to really exercise your test suite and see how well it covers you from changes in functionality</a:t>
+            </a:r>
+          </a:p>
+          <a:p>
+            <a:r>
+              <a:rPr lang="en-US" dirty="0"/>
+              <a:t>The way that it achieves this is by going into your code and fundamentally changing the functionality and then running your tests</a:t>
+            </a:r>
+          </a:p>
+          <a:p>
+            <a:endParaRPr lang="en-US" dirty="0"/>
+          </a:p>
+          <a:p>
+            <a:r>
+              <a:rPr lang="en-US" dirty="0"/>
+              <a:t>Hopefully with changed functionality at least one test fails.</a:t>
+            </a:r>
+          </a:p>
+        </p:txBody>
+      </p:sp>
+      <p:sp>
+        <p:nvSpPr>
+          <p:cNvPr id="4" name="Slide Number Placeholder 3"/>
+          <p:cNvSpPr>
+            <a:spLocks noGrp="1"/>
+          </p:cNvSpPr>
+          <p:nvPr>
+            <p:ph type="sldNum" sz="quarter" idx="5"/>
+          </p:nvPr>
+        </p:nvSpPr>
+        <p:spPr/>
+        <p:txBody>
+          <a:bodyPr/>
+          <a:lstStyle/>
+          <a:p>
+            <a:fld id="{D06C7275-F3C5-4EE7-8C54-771BE2CF8BB4}" type="slidenum">
+              <a:rPr lang="en-US" smtClean="0"/>
+              <a:t>16</a:t>
+            </a:fld>
+            <a:endParaRPr lang="en-US"/>
+          </a:p>
+        </p:txBody>
+      </p:sp>
+    </p:spTree>
+    <p:extLst>
+      <p:ext uri="{BB962C8B-B14F-4D97-AF65-F5344CB8AC3E}">
+        <p14:creationId xmlns:p14="http://schemas.microsoft.com/office/powerpoint/2010/main" val="3390565547"/>
+      </p:ext>
+    </p:extLst>
+  </p:cSld>
+  <p:clrMapOvr>
+    <a:masterClrMapping/>
+  </p:clrMapOvr>
+</p:notes>
+</file>
+
+<file path=ppt/notesSlides/notesSlide14.xml><?xml version="1.0" encoding="utf-8"?>
+<p:notes xmlns:a="http://schemas.openxmlformats.org/drawingml/2006/main" xmlns:r="http://schemas.openxmlformats.org/officeDocument/2006/relationships" xmlns:p="http://schemas.openxmlformats.org/presentationml/2006/main">
+  <p:cSld>
+    <p:spTree>
+      <p:nvGrpSpPr>
+        <p:cNvPr id="1" name=""/>
+        <p:cNvGrpSpPr/>
+        <p:nvPr/>
+      </p:nvGrpSpPr>
+      <p:grpSpPr>
+        <a:xfrm>
+          <a:off x="0" y="0"/>
+          <a:ext cx="0" cy="0"/>
+          <a:chOff x="0" y="0"/>
+          <a:chExt cx="0" cy="0"/>
+        </a:xfrm>
+      </p:grpSpPr>
+      <p:sp>
+        <p:nvSpPr>
+          <p:cNvPr id="2" name="Slide Image Placeholder 1"/>
+          <p:cNvSpPr>
+            <a:spLocks noGrp="1" noRot="1" noChangeAspect="1"/>
+          </p:cNvSpPr>
+          <p:nvPr>
+            <p:ph type="sldImg"/>
+          </p:nvPr>
+        </p:nvSpPr>
+        <p:spPr/>
+      </p:sp>
+      <p:sp>
+        <p:nvSpPr>
+          <p:cNvPr id="3" name="Notes Placeholder 2"/>
+          <p:cNvSpPr>
+            <a:spLocks noGrp="1"/>
+          </p:cNvSpPr>
+          <p:nvPr>
+            <p:ph type="body" idx="1"/>
+          </p:nvPr>
+        </p:nvSpPr>
+        <p:spPr/>
+        <p:txBody>
+          <a:bodyPr/>
+          <a:lstStyle/>
+          <a:p>
+            <a:pPr marL="228600" indent="-228600">
+              <a:buAutoNum type="arabicPeriod"/>
+            </a:pPr>
+            <a:r>
+              <a:rPr lang="en-US" dirty="0"/>
+              <a:t>Very Computer Intensive – Using multiple cores at the same time</a:t>
+            </a:r>
+          </a:p>
+          <a:p>
+            <a:pPr marL="228600" indent="-228600">
+              <a:buAutoNum type="arabicPeriod"/>
+            </a:pPr>
+            <a:r>
+              <a:rPr lang="en-US" dirty="0"/>
+              <a:t>For Every Mutation must rerun entire test suite</a:t>
+            </a:r>
+          </a:p>
+          <a:p>
+            <a:pPr marL="228600" indent="-228600">
+              <a:buAutoNum type="arabicPeriod"/>
+            </a:pPr>
+            <a:r>
+              <a:rPr lang="en-US" dirty="0"/>
+              <a:t>With more time in between deploys automated testing was not as important</a:t>
+            </a:r>
+          </a:p>
+          <a:p>
+            <a:pPr marL="228600" indent="-228600">
+              <a:buAutoNum type="arabicPeriod"/>
+            </a:pPr>
+            <a:endParaRPr lang="en-US" dirty="0"/>
+          </a:p>
+          <a:p>
+            <a:pPr marL="0" indent="0">
+              <a:buNone/>
+            </a:pPr>
+            <a:endParaRPr lang="en-US" dirty="0"/>
+          </a:p>
+          <a:p>
+            <a:pPr marL="0" indent="0">
+              <a:buNone/>
+            </a:pPr>
+            <a:r>
+              <a:rPr lang="en-US" dirty="0" err="1"/>
+              <a:t>Whats</a:t>
+            </a:r>
+            <a:r>
+              <a:rPr lang="en-US" dirty="0"/>
+              <a:t> changed</a:t>
+            </a:r>
+          </a:p>
+          <a:p>
+            <a:pPr marL="0" indent="0">
+              <a:buNone/>
+            </a:pPr>
+            <a:endParaRPr lang="en-US" dirty="0"/>
+          </a:p>
+          <a:p>
+            <a:pPr marL="228600" indent="-228600">
+              <a:buAutoNum type="arabicPeriod"/>
+            </a:pPr>
+            <a:r>
+              <a:rPr lang="en-US" dirty="0"/>
+              <a:t>Basic computers have many cores to simultaneously run test suites</a:t>
+            </a:r>
+          </a:p>
+          <a:p>
+            <a:pPr marL="228600" indent="-228600">
+              <a:buAutoNum type="arabicPeriod"/>
+            </a:pPr>
+            <a:r>
+              <a:rPr lang="en-US" dirty="0"/>
+              <a:t>Running coverage analysis before mutation testing to figure out which tests to execute</a:t>
+            </a:r>
+          </a:p>
+          <a:p>
+            <a:pPr marL="228600" indent="-228600">
+              <a:buAutoNum type="arabicPeriod"/>
+            </a:pPr>
+            <a:r>
+              <a:rPr lang="en-US" dirty="0"/>
+              <a:t>Teams are deploying code more often and relying more on their automated test suites</a:t>
+            </a:r>
+          </a:p>
+        </p:txBody>
+      </p:sp>
+      <p:sp>
+        <p:nvSpPr>
+          <p:cNvPr id="4" name="Slide Number Placeholder 3"/>
+          <p:cNvSpPr>
+            <a:spLocks noGrp="1"/>
+          </p:cNvSpPr>
+          <p:nvPr>
+            <p:ph type="sldNum" sz="quarter" idx="5"/>
+          </p:nvPr>
+        </p:nvSpPr>
+        <p:spPr/>
+        <p:txBody>
+          <a:bodyPr/>
+          <a:lstStyle/>
+          <a:p>
+            <a:fld id="{D06C7275-F3C5-4EE7-8C54-771BE2CF8BB4}" type="slidenum">
+              <a:rPr lang="en-US" smtClean="0"/>
+              <a:t>19</a:t>
+            </a:fld>
+            <a:endParaRPr lang="en-US"/>
+          </a:p>
+        </p:txBody>
+      </p:sp>
+    </p:spTree>
+    <p:extLst>
+      <p:ext uri="{BB962C8B-B14F-4D97-AF65-F5344CB8AC3E}">
+        <p14:creationId xmlns:p14="http://schemas.microsoft.com/office/powerpoint/2010/main" val="2611822046"/>
+      </p:ext>
+    </p:extLst>
+  </p:cSld>
+  <p:clrMapOvr>
+    <a:masterClrMapping/>
+  </p:clrMapOvr>
+</p:notes>
+</file>
+
+<file path=ppt/notesSlides/notesSlide15.xml><?xml version="1.0" encoding="utf-8"?>
+<p:notes xmlns:a="http://schemas.openxmlformats.org/drawingml/2006/main" xmlns:r="http://schemas.openxmlformats.org/officeDocument/2006/relationships" xmlns:p="http://schemas.openxmlformats.org/presentationml/2006/main">
+  <p:cSld>
+    <p:spTree>
+      <p:nvGrpSpPr>
+        <p:cNvPr id="1" name=""/>
+        <p:cNvGrpSpPr/>
+        <p:nvPr/>
+      </p:nvGrpSpPr>
+      <p:grpSpPr>
+        <a:xfrm>
+          <a:off x="0" y="0"/>
+          <a:ext cx="0" cy="0"/>
+          <a:chOff x="0" y="0"/>
+          <a:chExt cx="0" cy="0"/>
+        </a:xfrm>
+      </p:grpSpPr>
+      <p:sp>
+        <p:nvSpPr>
+          <p:cNvPr id="2" name="Slide Image Placeholder 1"/>
+          <p:cNvSpPr>
+            <a:spLocks noGrp="1" noRot="1" noChangeAspect="1"/>
+          </p:cNvSpPr>
+          <p:nvPr>
+            <p:ph type="sldImg"/>
+          </p:nvPr>
+        </p:nvSpPr>
+        <p:spPr/>
+      </p:sp>
+      <p:sp>
+        <p:nvSpPr>
+          <p:cNvPr id="3" name="Notes Placeholder 2"/>
+          <p:cNvSpPr>
+            <a:spLocks noGrp="1"/>
+          </p:cNvSpPr>
+          <p:nvPr>
+            <p:ph type="body" idx="1"/>
+          </p:nvPr>
+        </p:nvSpPr>
+        <p:spPr/>
+        <p:txBody>
+          <a:bodyPr/>
+          <a:lstStyle/>
+          <a:p>
+            <a:r>
+              <a:rPr lang="en-US" dirty="0"/>
+              <a:t>When jumping into legacy code and you don’t know the quality of the tests.</a:t>
+            </a:r>
+          </a:p>
+          <a:p>
+            <a:r>
+              <a:rPr lang="en-US" dirty="0"/>
+              <a:t>Very computationally heavy parts of the code – talk about scoring algorithm at </a:t>
+            </a:r>
+            <a:r>
+              <a:rPr lang="en-US" dirty="0" err="1"/>
+              <a:t>Emmersion</a:t>
+            </a:r>
+            <a:r>
+              <a:rPr lang="en-US" dirty="0"/>
+              <a:t>.</a:t>
+            </a:r>
+          </a:p>
+          <a:p>
+            <a:endParaRPr lang="en-US" dirty="0"/>
+          </a:p>
+          <a:p>
+            <a:r>
+              <a:rPr lang="en-US" dirty="0"/>
+              <a:t>Just finished writing a critical feature that would be expensive if it accidentally broke – talk about how this does not apply to Facebook</a:t>
+            </a:r>
+          </a:p>
+          <a:p>
+            <a:endParaRPr lang="en-US" dirty="0"/>
+          </a:p>
+          <a:p>
+            <a:r>
+              <a:rPr lang="en-US" dirty="0"/>
+              <a:t>Probably don’t run mutation testing in CI/CD</a:t>
+            </a:r>
+          </a:p>
+          <a:p>
+            <a:endParaRPr lang="en-US" dirty="0"/>
+          </a:p>
+        </p:txBody>
+      </p:sp>
+      <p:sp>
+        <p:nvSpPr>
+          <p:cNvPr id="4" name="Slide Number Placeholder 3"/>
+          <p:cNvSpPr>
+            <a:spLocks noGrp="1"/>
+          </p:cNvSpPr>
+          <p:nvPr>
+            <p:ph type="sldNum" sz="quarter" idx="5"/>
+          </p:nvPr>
+        </p:nvSpPr>
+        <p:spPr/>
+        <p:txBody>
+          <a:bodyPr/>
+          <a:lstStyle/>
+          <a:p>
+            <a:fld id="{D06C7275-F3C5-4EE7-8C54-771BE2CF8BB4}" type="slidenum">
+              <a:rPr lang="en-US" smtClean="0"/>
+              <a:t>20</a:t>
+            </a:fld>
+            <a:endParaRPr lang="en-US"/>
+          </a:p>
+        </p:txBody>
+      </p:sp>
+    </p:spTree>
+    <p:extLst>
+      <p:ext uri="{BB962C8B-B14F-4D97-AF65-F5344CB8AC3E}">
+        <p14:creationId xmlns:p14="http://schemas.microsoft.com/office/powerpoint/2010/main" val="3099387395"/>
+      </p:ext>
+    </p:extLst>
+  </p:cSld>
+  <p:clrMapOvr>
+    <a:masterClrMapping/>
+  </p:clrMapOvr>
+</p:notes>
+</file>
+
 <file path=ppt/notesSlides/notesSlide2.xml><?xml version="1.0" encoding="utf-8"?>
 <p:notes xmlns:a="http://schemas.openxmlformats.org/drawingml/2006/main" xmlns:r="http://schemas.openxmlformats.org/officeDocument/2006/relationships" xmlns:p="http://schemas.openxmlformats.org/presentationml/2006/main">
   <p:cSld>
@@ -1193,7 +1591,7 @@
           <a:p>
             <a:r>
               <a:rPr lang="en-US" dirty="0"/>
-              <a:t>Executable documentation of code is maybe an outlier here but what I mean by that is if someone asked me what the current project that I am working on does I would immediately look to the UI/E2E testing suite and start reading off test names.</a:t>
+              <a:t>Executable documentation of code is maybe an outlier here but what I mean by that is if someone asked me what the features are in my current I would immediately look to the UI/E2E testing suite and start reading off test names.</a:t>
             </a:r>
           </a:p>
           <a:p>
@@ -1622,7 +2020,7 @@
           <a:p>
             <a:r>
               <a:rPr lang="en-US" dirty="0"/>
-              <a:t>How do you know how good your tests are?  How confident are you that mistakes in the code will get captured by your tests?  Do you currently have a way to measure your test quality?  What do you use?  </a:t>
+              <a:t>How do you know how good your tests are?  How confident are you that mistakes in the code will get captured by your tests?  Do you currently have a way to measure the quality of your tests?  What do you use?  </a:t>
             </a:r>
           </a:p>
         </p:txBody>
@@ -2961,7 +3359,7 @@
           <a:p>
             <a:fld id="{24452B38-B5B8-4C56-ADC3-B86414DDCBC8}" type="datetimeFigureOut">
               <a:rPr lang="en-US" smtClean="0"/>
-              <a:t>2/20/2020</a:t>
+              <a:t>2/21/2020</a:t>
             </a:fld>
             <a:endParaRPr lang="en-US"/>
           </a:p>
@@ -3070,7 +3468,7 @@
           </a:ln>
           <a:extLst>
             <a:ext uri="{C572A759-6A51-4108-AA02-DFA0A04FC94B}">
-              <ma14:wrappingTextBoxFlag xmlns:ma14="http://schemas.microsoft.com/office/mac/drawingml/2011/main" xmlns="" val="1"/>
+              <ma14:wrappingTextBoxFlag xmlns="" xmlns:ma14="http://schemas.microsoft.com/office/mac/drawingml/2011/main" val="1"/>
             </a:ext>
           </a:extLst>
         </p:spPr>
@@ -3109,7 +3507,7 @@
           </a:ln>
           <a:extLst>
             <a:ext uri="{C572A759-6A51-4108-AA02-DFA0A04FC94B}">
-              <ma14:wrappingTextBoxFlag xmlns:ma14="http://schemas.microsoft.com/office/mac/drawingml/2011/main" xmlns="" val="1"/>
+              <ma14:wrappingTextBoxFlag xmlns="" xmlns:ma14="http://schemas.microsoft.com/office/mac/drawingml/2011/main" val="1"/>
             </a:ext>
           </a:extLst>
         </p:spPr>
@@ -4456,7 +4854,7 @@
             <a:pPr algn="ctr"/>
             <a:r>
               <a:rPr lang="en-US" b="1" dirty="0"/>
-              <a:t>Are there implications for the test quality?</a:t>
+              <a:t>What are implications for the quality of the tests?</a:t>
             </a:r>
           </a:p>
         </p:txBody>
@@ -4755,8 +5153,8 @@
         </p:nvSpPr>
         <p:spPr>
           <a:xfrm>
-            <a:off x="572727" y="6419181"/>
-            <a:ext cx="6832959" cy="369330"/>
+            <a:off x="0" y="6488670"/>
+            <a:ext cx="6509152" cy="369330"/>
           </a:xfrm>
           <a:prstGeom prst="rect">
             <a:avLst/>
@@ -4789,11 +5187,9 @@
           <a:p>
             <a:r>
               <a:rPr lang="en-US" dirty="0">
-                <a:solidFill>
-                  <a:schemeClr val="bg1"/>
-                </a:solidFill>
+                <a:hlinkClick r:id="rId3"/>
               </a:rPr>
-              <a:t>https://github.com/MatthewYKnowles/who-watches-the-watchmen.git</a:t>
+              <a:t>https://github.com/MatthewYKnowles/Refactoring-Exercise-Rentals</a:t>
             </a:r>
             <a:endParaRPr kumimoji="0" lang="en-US" sz="1800" b="0" i="0" u="none" strike="noStrike" cap="none" spc="0" normalizeH="0" baseline="0" dirty="0">
               <a:ln>
@@ -4842,193 +5238,307 @@
       </p:grpSpPr>
       <p:sp>
         <p:nvSpPr>
-          <p:cNvPr id="5" name="Title 1">
+          <p:cNvPr id="4" name="Title 3">
             <a:extLst>
               <a:ext uri="{FF2B5EF4-FFF2-40B4-BE49-F238E27FC236}">
-                <a16:creationId xmlns:a16="http://schemas.microsoft.com/office/drawing/2014/main" id="{3F10142B-5F58-0C44-B3A9-1D6B01948EC5}"/>
+                <a16:creationId xmlns:a16="http://schemas.microsoft.com/office/drawing/2014/main" id="{4BF8C8B3-F8C0-4CC6-ADAF-AAEFAE262570}"/>
               </a:ext>
             </a:extLst>
           </p:cNvPr>
-          <p:cNvSpPr>
-            <a:spLocks noGrp="1"/>
-          </p:cNvSpPr>
-          <p:nvPr>
-            <p:ph type="title"/>
-          </p:nvPr>
+          <p:cNvSpPr txBox="1">
+            <a:spLocks/>
+          </p:cNvSpPr>
+          <p:nvPr/>
         </p:nvSpPr>
         <p:spPr>
           <a:xfrm>
-            <a:off x="572727" y="0"/>
-            <a:ext cx="11326761" cy="1325563"/>
+            <a:off x="838199" y="2766218"/>
+            <a:ext cx="10515601" cy="1325563"/>
           </a:xfrm>
+          <a:prstGeom prst="rect">
+            <a:avLst/>
+          </a:prstGeom>
+          <a:ln w="12700">
+            <a:miter lim="400000"/>
+          </a:ln>
+          <a:extLst>
+            <a:ext uri="{C572A759-6A51-4108-AA02-DFA0A04FC94B}">
+              <ma14:wrappingTextBoxFlag xmlns="" xmlns:ma14="http://schemas.microsoft.com/office/mac/drawingml/2011/main" val="1"/>
+            </a:ext>
+          </a:extLst>
         </p:spPr>
         <p:txBody>
-          <a:bodyPr>
-            <a:noAutofit/>
+          <a:bodyPr lIns="45719" rIns="45719" anchor="ctr">
+            <a:normAutofit/>
           </a:bodyPr>
-          <a:lstStyle/>
-          <a:p>
-            <a:r>
-              <a:rPr lang="en-US" sz="5400" b="1" dirty="0"/>
-              <a:t>How would you mutate this code?</a:t>
-            </a:r>
-            <a:r>
-              <a:rPr lang="en-US" sz="1050" b="1" dirty="0">
+          <a:lstStyle>
+            <a:lvl1pPr marL="0" marR="0" indent="0" algn="l" defTabSz="914400" eaLnBrk="1" latinLnBrk="0" hangingPunct="1">
+              <a:lnSpc>
+                <a:spcPct val="100000"/>
+              </a:lnSpc>
+              <a:spcBef>
+                <a:spcPts val="0"/>
+              </a:spcBef>
+              <a:spcAft>
+                <a:spcPts val="0"/>
+              </a:spcAft>
+              <a:buClrTx/>
+              <a:buSzTx/>
+              <a:buFontTx/>
+              <a:buNone/>
+              <a:tabLst/>
+              <a:defRPr sz="4400" b="0" i="0" u="none" strike="noStrike" cap="none" spc="0" baseline="0">
+                <a:ln>
+                  <a:noFill/>
+                </a:ln>
                 <a:solidFill>
-                  <a:srgbClr val="000000"/>
+                  <a:srgbClr val="1173B2"/>
                 </a:solidFill>
-                <a:latin typeface="Times"/>
-                <a:ea typeface="Times"/>
-                <a:cs typeface="Times"/>
-                <a:sym typeface="Times"/>
-              </a:rPr>
-              <a:t> </a:t>
-            </a:r>
-            <a:endParaRPr lang="en-US" sz="5400" b="1" dirty="0"/>
-          </a:p>
-        </p:txBody>
-      </p:sp>
-      <p:sp>
-        <p:nvSpPr>
-          <p:cNvPr id="6" name="Text Placeholder 2">
-            <a:extLst>
-              <a:ext uri="{FF2B5EF4-FFF2-40B4-BE49-F238E27FC236}">
-                <a16:creationId xmlns:a16="http://schemas.microsoft.com/office/drawing/2014/main" id="{5A1742E5-F676-B449-91DA-CD15AEEE08EE}"/>
-              </a:ext>
-            </a:extLst>
-          </p:cNvPr>
-          <p:cNvSpPr>
-            <a:spLocks noGrp="1"/>
-          </p:cNvSpPr>
-          <p:nvPr>
-            <p:ph type="body" sz="quarter" idx="1"/>
-          </p:nvPr>
-        </p:nvSpPr>
-        <p:spPr>
-          <a:xfrm>
-            <a:off x="572727" y="1769804"/>
-            <a:ext cx="9603659" cy="4734233"/>
-          </a:xfrm>
-        </p:spPr>
-        <p:txBody>
-          <a:bodyPr>
-            <a:noAutofit/>
-          </a:bodyPr>
-          <a:lstStyle/>
-          <a:p>
-            <a:pPr algn="l" defTabSz="457200">
+                <a:uFillTx/>
+                <a:latin typeface="Avenir LT Std 35 Light" panose="020B0402020203020204" pitchFamily="34" charset="0"/>
+                <a:ea typeface="+mn-ea"/>
+                <a:cs typeface="+mn-cs"/>
+                <a:sym typeface="Calibri"/>
+              </a:defRPr>
+            </a:lvl1pPr>
+            <a:lvl2pPr marL="0" marR="0" indent="0" algn="l" defTabSz="914400" eaLnBrk="1" latinLnBrk="0" hangingPunct="1">
               <a:lnSpc>
-                <a:spcPct val="150000"/>
+                <a:spcPct val="90000"/>
               </a:lnSpc>
-              <a:defRPr sz="3666" b="0">
+              <a:spcBef>
+                <a:spcPts val="0"/>
+              </a:spcBef>
+              <a:spcAft>
+                <a:spcPts val="0"/>
+              </a:spcAft>
+              <a:buClrTx/>
+              <a:buSzTx/>
+              <a:buFontTx/>
+              <a:buNone/>
+              <a:tabLst/>
+              <a:defRPr sz="4400" b="0" i="0" u="none" strike="noStrike" cap="none" spc="0" baseline="0">
+                <a:ln>
+                  <a:noFill/>
+                </a:ln>
                 <a:solidFill>
-                  <a:srgbClr val="404040"/>
+                  <a:srgbClr val="1173B2"/>
                 </a:solidFill>
+                <a:uFillTx/>
+                <a:latin typeface="+mn-lt"/>
+                <a:ea typeface="+mn-ea"/>
+                <a:cs typeface="+mn-cs"/>
+                <a:sym typeface="Calibri"/>
               </a:defRPr>
-            </a:pPr>
-            <a:r>
-              <a:rPr lang="en-US" sz="3600" b="1" dirty="0">
+            </a:lvl2pPr>
+            <a:lvl3pPr marL="0" marR="0" indent="0" algn="l" defTabSz="914400" eaLnBrk="1" latinLnBrk="0" hangingPunct="1">
+              <a:lnSpc>
+                <a:spcPct val="90000"/>
+              </a:lnSpc>
+              <a:spcBef>
+                <a:spcPts val="0"/>
+              </a:spcBef>
+              <a:spcAft>
+                <a:spcPts val="0"/>
+              </a:spcAft>
+              <a:buClrTx/>
+              <a:buSzTx/>
+              <a:buFontTx/>
+              <a:buNone/>
+              <a:tabLst/>
+              <a:defRPr sz="4400" b="0" i="0" u="none" strike="noStrike" cap="none" spc="0" baseline="0">
+                <a:ln>
+                  <a:noFill/>
+                </a:ln>
                 <a:solidFill>
-                  <a:schemeClr val="bg1"/>
+                  <a:srgbClr val="1173B2"/>
                 </a:solidFill>
-              </a:rPr>
-              <a:t> 1. a &lt; b</a:t>
-            </a:r>
-          </a:p>
-          <a:p>
-            <a:pPr algn="l" defTabSz="457200">
+                <a:uFillTx/>
+                <a:latin typeface="+mn-lt"/>
+                <a:ea typeface="+mn-ea"/>
+                <a:cs typeface="+mn-cs"/>
+                <a:sym typeface="Calibri"/>
+              </a:defRPr>
+            </a:lvl3pPr>
+            <a:lvl4pPr marL="0" marR="0" indent="0" algn="l" defTabSz="914400" eaLnBrk="1" latinLnBrk="0" hangingPunct="1">
               <a:lnSpc>
-                <a:spcPct val="150000"/>
+                <a:spcPct val="90000"/>
               </a:lnSpc>
-              <a:defRPr sz="3666" b="0">
+              <a:spcBef>
+                <a:spcPts val="0"/>
+              </a:spcBef>
+              <a:spcAft>
+                <a:spcPts val="0"/>
+              </a:spcAft>
+              <a:buClrTx/>
+              <a:buSzTx/>
+              <a:buFontTx/>
+              <a:buNone/>
+              <a:tabLst/>
+              <a:defRPr sz="4400" b="0" i="0" u="none" strike="noStrike" cap="none" spc="0" baseline="0">
+                <a:ln>
+                  <a:noFill/>
+                </a:ln>
                 <a:solidFill>
-                  <a:srgbClr val="404040"/>
+                  <a:srgbClr val="1173B2"/>
                 </a:solidFill>
+                <a:uFillTx/>
+                <a:latin typeface="+mn-lt"/>
+                <a:ea typeface="+mn-ea"/>
+                <a:cs typeface="+mn-cs"/>
+                <a:sym typeface="Calibri"/>
               </a:defRPr>
-            </a:pPr>
-            <a:r>
-              <a:rPr lang="en-US" sz="3600" b="1" dirty="0">
+            </a:lvl4pPr>
+            <a:lvl5pPr marL="0" marR="0" indent="0" algn="l" defTabSz="914400" eaLnBrk="1" latinLnBrk="0" hangingPunct="1">
+              <a:lnSpc>
+                <a:spcPct val="90000"/>
+              </a:lnSpc>
+              <a:spcBef>
+                <a:spcPts val="0"/>
+              </a:spcBef>
+              <a:spcAft>
+                <a:spcPts val="0"/>
+              </a:spcAft>
+              <a:buClrTx/>
+              <a:buSzTx/>
+              <a:buFontTx/>
+              <a:buNone/>
+              <a:tabLst/>
+              <a:defRPr sz="4400" b="0" i="0" u="none" strike="noStrike" cap="none" spc="0" baseline="0">
+                <a:ln>
+                  <a:noFill/>
+                </a:ln>
                 <a:solidFill>
-                  <a:schemeClr val="bg1"/>
+                  <a:srgbClr val="1173B2"/>
                 </a:solidFill>
-              </a:rPr>
-              <a:t> 2. a || b</a:t>
-            </a:r>
-          </a:p>
-          <a:p>
-            <a:pPr algn="l" defTabSz="457200">
+                <a:uFillTx/>
+                <a:latin typeface="+mn-lt"/>
+                <a:ea typeface="+mn-ea"/>
+                <a:cs typeface="+mn-cs"/>
+                <a:sym typeface="Calibri"/>
+              </a:defRPr>
+            </a:lvl5pPr>
+            <a:lvl6pPr marL="0" marR="0" indent="0" algn="l" defTabSz="914400" eaLnBrk="1" latinLnBrk="0" hangingPunct="1">
               <a:lnSpc>
-                <a:spcPct val="150000"/>
+                <a:spcPct val="90000"/>
               </a:lnSpc>
-              <a:defRPr sz="3666" b="0">
+              <a:spcBef>
+                <a:spcPts val="0"/>
+              </a:spcBef>
+              <a:spcAft>
+                <a:spcPts val="0"/>
+              </a:spcAft>
+              <a:buClrTx/>
+              <a:buSzTx/>
+              <a:buFontTx/>
+              <a:buNone/>
+              <a:tabLst/>
+              <a:defRPr sz="4400" b="0" i="0" u="none" strike="noStrike" cap="none" spc="0" baseline="0">
+                <a:ln>
+                  <a:noFill/>
+                </a:ln>
                 <a:solidFill>
-                  <a:srgbClr val="404040"/>
+                  <a:srgbClr val="1173B2"/>
                 </a:solidFill>
+                <a:uFillTx/>
+                <a:latin typeface="+mn-lt"/>
+                <a:ea typeface="+mn-ea"/>
+                <a:cs typeface="+mn-cs"/>
+                <a:sym typeface="Calibri"/>
               </a:defRPr>
-            </a:pPr>
-            <a:r>
-              <a:rPr lang="en-US" sz="3600" b="1" dirty="0">
+            </a:lvl6pPr>
+            <a:lvl7pPr marL="0" marR="0" indent="0" algn="l" defTabSz="914400" eaLnBrk="1" latinLnBrk="0" hangingPunct="1">
+              <a:lnSpc>
+                <a:spcPct val="90000"/>
+              </a:lnSpc>
+              <a:spcBef>
+                <a:spcPts val="0"/>
+              </a:spcBef>
+              <a:spcAft>
+                <a:spcPts val="0"/>
+              </a:spcAft>
+              <a:buClrTx/>
+              <a:buSzTx/>
+              <a:buFontTx/>
+              <a:buNone/>
+              <a:tabLst/>
+              <a:defRPr sz="4400" b="0" i="0" u="none" strike="noStrike" cap="none" spc="0" baseline="0">
+                <a:ln>
+                  <a:noFill/>
+                </a:ln>
                 <a:solidFill>
-                  <a:schemeClr val="bg1"/>
+                  <a:srgbClr val="1173B2"/>
                 </a:solidFill>
-              </a:rPr>
-              <a:t> 3. a == b</a:t>
-            </a:r>
-          </a:p>
-          <a:p>
-            <a:pPr algn="l" defTabSz="457200">
+                <a:uFillTx/>
+                <a:latin typeface="+mn-lt"/>
+                <a:ea typeface="+mn-ea"/>
+                <a:cs typeface="+mn-cs"/>
+                <a:sym typeface="Calibri"/>
+              </a:defRPr>
+            </a:lvl7pPr>
+            <a:lvl8pPr marL="0" marR="0" indent="0" algn="l" defTabSz="914400" eaLnBrk="1" latinLnBrk="0" hangingPunct="1">
               <a:lnSpc>
-                <a:spcPct val="150000"/>
+                <a:spcPct val="90000"/>
               </a:lnSpc>
-              <a:defRPr sz="3666" b="0">
+              <a:spcBef>
+                <a:spcPts val="0"/>
+              </a:spcBef>
+              <a:spcAft>
+                <a:spcPts val="0"/>
+              </a:spcAft>
+              <a:buClrTx/>
+              <a:buSzTx/>
+              <a:buFontTx/>
+              <a:buNone/>
+              <a:tabLst/>
+              <a:defRPr sz="4400" b="0" i="0" u="none" strike="noStrike" cap="none" spc="0" baseline="0">
+                <a:ln>
+                  <a:noFill/>
+                </a:ln>
                 <a:solidFill>
-                  <a:srgbClr val="404040"/>
+                  <a:srgbClr val="1173B2"/>
                 </a:solidFill>
+                <a:uFillTx/>
+                <a:latin typeface="+mn-lt"/>
+                <a:ea typeface="+mn-ea"/>
+                <a:cs typeface="+mn-cs"/>
+                <a:sym typeface="Calibri"/>
               </a:defRPr>
-            </a:pPr>
-            <a:r>
-              <a:rPr lang="en-US" sz="3600" b="1" dirty="0">
+            </a:lvl8pPr>
+            <a:lvl9pPr marL="0" marR="0" indent="0" algn="l" defTabSz="914400" eaLnBrk="1" latinLnBrk="0" hangingPunct="1">
+              <a:lnSpc>
+                <a:spcPct val="90000"/>
+              </a:lnSpc>
+              <a:spcBef>
+                <a:spcPts val="0"/>
+              </a:spcBef>
+              <a:spcAft>
+                <a:spcPts val="0"/>
+              </a:spcAft>
+              <a:buClrTx/>
+              <a:buSzTx/>
+              <a:buFontTx/>
+              <a:buNone/>
+              <a:tabLst/>
+              <a:defRPr sz="4400" b="0" i="0" u="none" strike="noStrike" cap="none" spc="0" baseline="0">
+                <a:ln>
+                  <a:noFill/>
+                </a:ln>
                 <a:solidFill>
-                  <a:schemeClr val="bg1"/>
+                  <a:srgbClr val="1173B2"/>
                 </a:solidFill>
-              </a:rPr>
-              <a:t> 4. if(a &gt; b) {return </a:t>
-            </a:r>
-            <a:r>
-              <a:rPr lang="en-US" sz="3600" b="1" dirty="0" err="1">
-                <a:solidFill>
-                  <a:schemeClr val="bg1"/>
-                </a:solidFill>
-              </a:rPr>
-              <a:t>a+b</a:t>
-            </a:r>
-            <a:r>
-              <a:rPr lang="en-US" sz="3600" b="1" dirty="0">
-                <a:solidFill>
-                  <a:schemeClr val="bg1"/>
-                </a:solidFill>
-              </a:rPr>
-              <a:t>}</a:t>
-            </a:r>
-          </a:p>
-          <a:p>
-            <a:pPr algn="l" defTabSz="457200">
-              <a:lnSpc>
-                <a:spcPct val="150000"/>
-              </a:lnSpc>
-              <a:defRPr sz="3666" b="0">
-                <a:solidFill>
-                  <a:srgbClr val="404040"/>
-                </a:solidFill>
+                <a:uFillTx/>
+                <a:latin typeface="+mn-lt"/>
+                <a:ea typeface="+mn-ea"/>
+                <a:cs typeface="+mn-cs"/>
+                <a:sym typeface="Calibri"/>
               </a:defRPr>
-            </a:pPr>
-            <a:r>
-              <a:rPr lang="en-US" sz="3600" b="1" dirty="0">
-                <a:solidFill>
-                  <a:schemeClr val="bg1"/>
-                </a:solidFill>
-              </a:rPr>
-              <a:t> 5. if(b &gt; a) {a++}</a:t>
+            </a:lvl9pPr>
+          </a:lstStyle>
+          <a:p>
+            <a:pPr algn="ctr"/>
+            <a:r>
+              <a:rPr lang="en-US" sz="6000" b="1" dirty="0"/>
+              <a:t>Mutation Testing</a:t>
             </a:r>
           </a:p>
         </p:txBody>
@@ -5036,7 +5546,7 @@
     </p:spTree>
     <p:extLst>
       <p:ext uri="{BB962C8B-B14F-4D97-AF65-F5344CB8AC3E}">
-        <p14:creationId xmlns:p14="http://schemas.microsoft.com/office/powerpoint/2010/main" val="157346923"/>
+        <p14:creationId xmlns:p14="http://schemas.microsoft.com/office/powerpoint/2010/main" val="3726167602"/>
       </p:ext>
     </p:extLst>
   </p:cSld>
@@ -5066,10 +5576,10 @@
       </p:grpSpPr>
       <p:sp>
         <p:nvSpPr>
-          <p:cNvPr id="3" name="Title 2">
+          <p:cNvPr id="5" name="Title 1">
             <a:extLst>
               <a:ext uri="{FF2B5EF4-FFF2-40B4-BE49-F238E27FC236}">
-                <a16:creationId xmlns:a16="http://schemas.microsoft.com/office/drawing/2014/main" id="{4C281C63-46B9-46CA-AF8C-20C8B2BF606D}"/>
+                <a16:creationId xmlns:a16="http://schemas.microsoft.com/office/drawing/2014/main" id="{3F10142B-5F58-0C44-B3A9-1D6B01948EC5}"/>
               </a:ext>
             </a:extLst>
           </p:cNvPr>
@@ -5080,26 +5590,187 @@
             <p:ph type="title"/>
           </p:nvPr>
         </p:nvSpPr>
-        <p:spPr/>
+        <p:spPr>
+          <a:xfrm>
+            <a:off x="572727" y="0"/>
+            <a:ext cx="11326761" cy="1325563"/>
+          </a:xfrm>
+        </p:spPr>
         <p:txBody>
           <a:bodyPr>
-            <a:normAutofit fontScale="90000"/>
+            <a:noAutofit/>
           </a:bodyPr>
           <a:lstStyle/>
           <a:p>
-            <a:pPr algn="ctr"/>
-            <a:r>
-              <a:rPr lang="en-US" b="1" dirty="0"/>
-              <a:t>If mutation testing is so awesome, why has no one heard of it?</a:t>
-            </a:r>
-            <a:endParaRPr lang="en-US" dirty="0"/>
+            <a:r>
+              <a:rPr lang="en-US" sz="5400" b="1" dirty="0"/>
+              <a:t>How would you mutate this code?</a:t>
+            </a:r>
+            <a:r>
+              <a:rPr lang="en-US" sz="1050" b="1" dirty="0">
+                <a:solidFill>
+                  <a:srgbClr val="000000"/>
+                </a:solidFill>
+                <a:latin typeface="Times"/>
+                <a:ea typeface="Times"/>
+                <a:cs typeface="Times"/>
+                <a:sym typeface="Times"/>
+              </a:rPr>
+              <a:t> </a:t>
+            </a:r>
+            <a:endParaRPr lang="en-US" sz="5400" b="1" dirty="0"/>
+          </a:p>
+        </p:txBody>
+      </p:sp>
+      <p:sp>
+        <p:nvSpPr>
+          <p:cNvPr id="6" name="Text Placeholder 2">
+            <a:extLst>
+              <a:ext uri="{FF2B5EF4-FFF2-40B4-BE49-F238E27FC236}">
+                <a16:creationId xmlns:a16="http://schemas.microsoft.com/office/drawing/2014/main" id="{5A1742E5-F676-B449-91DA-CD15AEEE08EE}"/>
+              </a:ext>
+            </a:extLst>
+          </p:cNvPr>
+          <p:cNvSpPr>
+            <a:spLocks noGrp="1"/>
+          </p:cNvSpPr>
+          <p:nvPr>
+            <p:ph type="body" sz="quarter" idx="1"/>
+          </p:nvPr>
+        </p:nvSpPr>
+        <p:spPr>
+          <a:xfrm>
+            <a:off x="572727" y="1769804"/>
+            <a:ext cx="9603659" cy="4734233"/>
+          </a:xfrm>
+        </p:spPr>
+        <p:txBody>
+          <a:bodyPr>
+            <a:noAutofit/>
+          </a:bodyPr>
+          <a:lstStyle/>
+          <a:p>
+            <a:pPr algn="l" defTabSz="457200">
+              <a:lnSpc>
+                <a:spcPct val="150000"/>
+              </a:lnSpc>
+              <a:defRPr sz="3666" b="0">
+                <a:solidFill>
+                  <a:srgbClr val="404040"/>
+                </a:solidFill>
+              </a:defRPr>
+            </a:pPr>
+            <a:r>
+              <a:rPr lang="en-US" sz="3600" b="1" dirty="0">
+                <a:solidFill>
+                  <a:schemeClr val="bg1"/>
+                </a:solidFill>
+              </a:rPr>
+              <a:t> 1. a &lt; b</a:t>
+            </a:r>
+          </a:p>
+          <a:p>
+            <a:pPr algn="l" defTabSz="457200">
+              <a:lnSpc>
+                <a:spcPct val="150000"/>
+              </a:lnSpc>
+              <a:defRPr sz="3666" b="0">
+                <a:solidFill>
+                  <a:srgbClr val="404040"/>
+                </a:solidFill>
+              </a:defRPr>
+            </a:pPr>
+            <a:r>
+              <a:rPr lang="en-US" sz="3600" b="1" dirty="0">
+                <a:solidFill>
+                  <a:schemeClr val="bg1"/>
+                </a:solidFill>
+              </a:rPr>
+              <a:t> 2. a || b</a:t>
+            </a:r>
+          </a:p>
+          <a:p>
+            <a:pPr algn="l" defTabSz="457200">
+              <a:lnSpc>
+                <a:spcPct val="150000"/>
+              </a:lnSpc>
+              <a:defRPr sz="3666" b="0">
+                <a:solidFill>
+                  <a:srgbClr val="404040"/>
+                </a:solidFill>
+              </a:defRPr>
+            </a:pPr>
+            <a:r>
+              <a:rPr lang="en-US" sz="3600" b="1" dirty="0">
+                <a:solidFill>
+                  <a:schemeClr val="bg1"/>
+                </a:solidFill>
+              </a:rPr>
+              <a:t> 3. a == b</a:t>
+            </a:r>
+          </a:p>
+          <a:p>
+            <a:pPr algn="l" defTabSz="457200">
+              <a:lnSpc>
+                <a:spcPct val="150000"/>
+              </a:lnSpc>
+              <a:defRPr sz="3666" b="0">
+                <a:solidFill>
+                  <a:srgbClr val="404040"/>
+                </a:solidFill>
+              </a:defRPr>
+            </a:pPr>
+            <a:r>
+              <a:rPr lang="en-US" sz="3600" b="1" dirty="0">
+                <a:solidFill>
+                  <a:schemeClr val="bg1"/>
+                </a:solidFill>
+              </a:rPr>
+              <a:t> 4. if(a &gt; b) {return </a:t>
+            </a:r>
+            <a:r>
+              <a:rPr lang="en-US" sz="3600" b="1" dirty="0" err="1">
+                <a:solidFill>
+                  <a:schemeClr val="bg1"/>
+                </a:solidFill>
+              </a:rPr>
+              <a:t>a+b</a:t>
+            </a:r>
+            <a:r>
+              <a:rPr lang="en-US" sz="3600" b="1" dirty="0">
+                <a:solidFill>
+                  <a:schemeClr val="bg1"/>
+                </a:solidFill>
+              </a:rPr>
+              <a:t>}</a:t>
+            </a:r>
+          </a:p>
+          <a:p>
+            <a:pPr algn="l" defTabSz="457200">
+              <a:lnSpc>
+                <a:spcPct val="150000"/>
+              </a:lnSpc>
+              <a:defRPr sz="3666" b="0">
+                <a:solidFill>
+                  <a:srgbClr val="404040"/>
+                </a:solidFill>
+              </a:defRPr>
+            </a:pPr>
+            <a:r>
+              <a:rPr lang="en-US" sz="3600" b="1" dirty="0">
+                <a:solidFill>
+                  <a:schemeClr val="bg1"/>
+                </a:solidFill>
+              </a:rPr>
+              <a:t> 5. if(b &gt; a) {a++}</a:t>
+            </a:r>
           </a:p>
         </p:txBody>
       </p:sp>
     </p:spTree>
     <p:extLst>
       <p:ext uri="{BB962C8B-B14F-4D97-AF65-F5344CB8AC3E}">
-        <p14:creationId xmlns:p14="http://schemas.microsoft.com/office/powerpoint/2010/main" val="1663681260"/>
+        <p14:creationId xmlns:p14="http://schemas.microsoft.com/office/powerpoint/2010/main" val="157346923"/>
       </p:ext>
     </p:extLst>
   </p:cSld>
@@ -5127,6 +5798,522 @@
           <a:chExt cx="0" cy="0"/>
         </a:xfrm>
       </p:grpSpPr>
+      <p:pic>
+        <p:nvPicPr>
+          <p:cNvPr id="4" name="Picture 3">
+            <a:extLst>
+              <a:ext uri="{FF2B5EF4-FFF2-40B4-BE49-F238E27FC236}">
+                <a16:creationId xmlns:a16="http://schemas.microsoft.com/office/drawing/2014/main" id="{AB9F72A4-0B6B-4C58-84A5-B38702FE57EA}"/>
+              </a:ext>
+            </a:extLst>
+          </p:cNvPr>
+          <p:cNvPicPr>
+            <a:picLocks noChangeAspect="1"/>
+          </p:cNvPicPr>
+          <p:nvPr/>
+        </p:nvPicPr>
+        <p:blipFill>
+          <a:blip r:embed="rId2"/>
+          <a:stretch>
+            <a:fillRect/>
+          </a:stretch>
+        </p:blipFill>
+        <p:spPr>
+          <a:xfrm>
+            <a:off x="2895600" y="637674"/>
+            <a:ext cx="6400800" cy="5582651"/>
+          </a:xfrm>
+          <a:prstGeom prst="rect">
+            <a:avLst/>
+          </a:prstGeom>
+        </p:spPr>
+      </p:pic>
+    </p:spTree>
+    <p:extLst>
+      <p:ext uri="{BB962C8B-B14F-4D97-AF65-F5344CB8AC3E}">
+        <p14:creationId xmlns:p14="http://schemas.microsoft.com/office/powerpoint/2010/main" val="333922288"/>
+      </p:ext>
+    </p:extLst>
+  </p:cSld>
+  <p:clrMapOvr>
+    <a:masterClrMapping/>
+  </p:clrMapOvr>
+  <p:transition spd="med"/>
+</p:sld>
+</file>
+
+<file path=ppt/slides/slide19.xml><?xml version="1.0" encoding="utf-8"?>
+<p:sld xmlns:a="http://schemas.openxmlformats.org/drawingml/2006/main" xmlns:r="http://schemas.openxmlformats.org/officeDocument/2006/relationships" xmlns:p="http://schemas.openxmlformats.org/presentationml/2006/main">
+  <p:cSld>
+    <p:spTree>
+      <p:nvGrpSpPr>
+        <p:cNvPr id="1" name=""/>
+        <p:cNvGrpSpPr/>
+        <p:nvPr/>
+      </p:nvGrpSpPr>
+      <p:grpSpPr>
+        <a:xfrm>
+          <a:off x="0" y="0"/>
+          <a:ext cx="0" cy="0"/>
+          <a:chOff x="0" y="0"/>
+          <a:chExt cx="0" cy="0"/>
+        </a:xfrm>
+      </p:grpSpPr>
+      <p:sp>
+        <p:nvSpPr>
+          <p:cNvPr id="3" name="Title 2">
+            <a:extLst>
+              <a:ext uri="{FF2B5EF4-FFF2-40B4-BE49-F238E27FC236}">
+                <a16:creationId xmlns:a16="http://schemas.microsoft.com/office/drawing/2014/main" id="{4C281C63-46B9-46CA-AF8C-20C8B2BF606D}"/>
+              </a:ext>
+            </a:extLst>
+          </p:cNvPr>
+          <p:cNvSpPr>
+            <a:spLocks noGrp="1"/>
+          </p:cNvSpPr>
+          <p:nvPr>
+            <p:ph type="title"/>
+          </p:nvPr>
+        </p:nvSpPr>
+        <p:spPr/>
+        <p:txBody>
+          <a:bodyPr>
+            <a:normAutofit fontScale="90000"/>
+          </a:bodyPr>
+          <a:lstStyle/>
+          <a:p>
+            <a:pPr algn="ctr"/>
+            <a:r>
+              <a:rPr lang="en-US" b="1" dirty="0"/>
+              <a:t>If mutation testing is so awesome, why has no one heard of it?</a:t>
+            </a:r>
+            <a:endParaRPr lang="en-US" dirty="0"/>
+          </a:p>
+        </p:txBody>
+      </p:sp>
+    </p:spTree>
+    <p:extLst>
+      <p:ext uri="{BB962C8B-B14F-4D97-AF65-F5344CB8AC3E}">
+        <p14:creationId xmlns:p14="http://schemas.microsoft.com/office/powerpoint/2010/main" val="1663681260"/>
+      </p:ext>
+    </p:extLst>
+  </p:cSld>
+  <p:clrMapOvr>
+    <a:masterClrMapping/>
+  </p:clrMapOvr>
+  <p:transition spd="med"/>
+</p:sld>
+</file>
+
+<file path=ppt/slides/slide2.xml><?xml version="1.0" encoding="utf-8"?>
+<p:sld xmlns:a="http://schemas.openxmlformats.org/drawingml/2006/main" xmlns:r="http://schemas.openxmlformats.org/officeDocument/2006/relationships" xmlns:p="http://schemas.openxmlformats.org/presentationml/2006/main">
+  <p:cSld>
+    <p:spTree>
+      <p:nvGrpSpPr>
+        <p:cNvPr id="1" name=""/>
+        <p:cNvGrpSpPr/>
+        <p:nvPr/>
+      </p:nvGrpSpPr>
+      <p:grpSpPr>
+        <a:xfrm>
+          <a:off x="0" y="0"/>
+          <a:ext cx="0" cy="0"/>
+          <a:chOff x="0" y="0"/>
+          <a:chExt cx="0" cy="0"/>
+        </a:xfrm>
+      </p:grpSpPr>
+      <p:sp>
+        <p:nvSpPr>
+          <p:cNvPr id="7" name="TextBox 6">
+            <a:extLst>
+              <a:ext uri="{FF2B5EF4-FFF2-40B4-BE49-F238E27FC236}">
+                <a16:creationId xmlns:a16="http://schemas.microsoft.com/office/drawing/2014/main" id="{5DB3407A-9FD9-4567-9261-3C7BF4AFC736}"/>
+              </a:ext>
+            </a:extLst>
+          </p:cNvPr>
+          <p:cNvSpPr txBox="1"/>
+          <p:nvPr/>
+        </p:nvSpPr>
+        <p:spPr>
+          <a:xfrm>
+            <a:off x="685801" y="3615355"/>
+            <a:ext cx="7650490" cy="2554543"/>
+          </a:xfrm>
+          <a:prstGeom prst="rect">
+            <a:avLst/>
+          </a:prstGeom>
+          <a:noFill/>
+          <a:ln w="12700" cap="flat">
+            <a:noFill/>
+            <a:miter lim="400000"/>
+          </a:ln>
+          <a:effectLst/>
+          <a:sp3d/>
+        </p:spPr>
+        <p:style>
+          <a:lnRef idx="0">
+            <a:scrgbClr r="0" g="0" b="0"/>
+          </a:lnRef>
+          <a:fillRef idx="0">
+            <a:scrgbClr r="0" g="0" b="0"/>
+          </a:fillRef>
+          <a:effectRef idx="0">
+            <a:scrgbClr r="0" g="0" b="0"/>
+          </a:effectRef>
+          <a:fontRef idx="none"/>
+        </p:style>
+        <p:txBody>
+          <a:bodyPr rot="0" spcFirstLastPara="1" vertOverflow="overflow" horzOverflow="overflow" vert="horz" wrap="none" lIns="45719" tIns="45719" rIns="45719" bIns="45719" numCol="1" spcCol="38100" rtlCol="0" anchor="t">
+            <a:spAutoFit/>
+          </a:bodyPr>
+          <a:lstStyle/>
+          <a:p>
+            <a:pPr marL="0" marR="0" indent="0" algn="l" defTabSz="914400" rtl="0" fontAlgn="auto" latinLnBrk="0" hangingPunct="0">
+              <a:lnSpc>
+                <a:spcPct val="100000"/>
+              </a:lnSpc>
+              <a:spcBef>
+                <a:spcPts val="0"/>
+              </a:spcBef>
+              <a:spcAft>
+                <a:spcPts val="0"/>
+              </a:spcAft>
+              <a:buClrTx/>
+              <a:buSzTx/>
+              <a:buFontTx/>
+              <a:buNone/>
+              <a:tabLst/>
+            </a:pPr>
+            <a:r>
+              <a:rPr kumimoji="0" lang="en-US" sz="3200" b="0" i="0" u="none" strike="noStrike" cap="none" spc="0" normalizeH="0" baseline="0" dirty="0">
+                <a:ln>
+                  <a:noFill/>
+                </a:ln>
+                <a:solidFill>
+                  <a:schemeClr val="bg1"/>
+                </a:solidFill>
+                <a:effectLst/>
+                <a:uFillTx/>
+                <a:latin typeface="+mn-lt"/>
+                <a:ea typeface="+mn-ea"/>
+                <a:cs typeface="+mn-cs"/>
+                <a:sym typeface="Calibri"/>
+              </a:rPr>
+              <a:t>Matthew Knowles</a:t>
+            </a:r>
+          </a:p>
+          <a:p>
+            <a:pPr marL="0" marR="0" indent="0" algn="l" defTabSz="914400" rtl="0" fontAlgn="auto" latinLnBrk="0" hangingPunct="0">
+              <a:lnSpc>
+                <a:spcPct val="100000"/>
+              </a:lnSpc>
+              <a:spcBef>
+                <a:spcPts val="0"/>
+              </a:spcBef>
+              <a:spcAft>
+                <a:spcPts val="0"/>
+              </a:spcAft>
+              <a:buClrTx/>
+              <a:buSzTx/>
+              <a:buFontTx/>
+              <a:buNone/>
+              <a:tabLst/>
+            </a:pPr>
+            <a:r>
+              <a:rPr lang="en-US" sz="3200" dirty="0">
+                <a:solidFill>
+                  <a:schemeClr val="bg1"/>
+                </a:solidFill>
+              </a:rPr>
+              <a:t>Software Engineer at Emmersion Learning</a:t>
+            </a:r>
+          </a:p>
+          <a:p>
+            <a:pPr marL="0" marR="0" indent="0" algn="l" defTabSz="914400" rtl="0" fontAlgn="auto" latinLnBrk="0" hangingPunct="0">
+              <a:lnSpc>
+                <a:spcPct val="100000"/>
+              </a:lnSpc>
+              <a:spcBef>
+                <a:spcPts val="0"/>
+              </a:spcBef>
+              <a:spcAft>
+                <a:spcPts val="0"/>
+              </a:spcAft>
+              <a:buClrTx/>
+              <a:buSzTx/>
+              <a:buFontTx/>
+              <a:buNone/>
+              <a:tabLst/>
+            </a:pPr>
+            <a:r>
+              <a:rPr kumimoji="0" lang="en-US" sz="3200" b="0" i="0" u="none" strike="noStrike" cap="none" spc="0" normalizeH="0" baseline="0" dirty="0">
+                <a:ln>
+                  <a:noFill/>
+                </a:ln>
+                <a:solidFill>
+                  <a:schemeClr val="bg1"/>
+                </a:solidFill>
+                <a:effectLst/>
+                <a:uFillTx/>
+                <a:latin typeface="+mn-lt"/>
+                <a:ea typeface="+mn-ea"/>
+                <a:cs typeface="+mn-cs"/>
+                <a:sym typeface="Calibri"/>
+              </a:rPr>
+              <a:t>www.EmmersionLearning.com</a:t>
+            </a:r>
+          </a:p>
+          <a:p>
+            <a:pPr marL="0" marR="0" indent="0" algn="l" defTabSz="914400" rtl="0" fontAlgn="auto" latinLnBrk="0" hangingPunct="0">
+              <a:lnSpc>
+                <a:spcPct val="100000"/>
+              </a:lnSpc>
+              <a:spcBef>
+                <a:spcPts val="0"/>
+              </a:spcBef>
+              <a:spcAft>
+                <a:spcPts val="0"/>
+              </a:spcAft>
+              <a:buClrTx/>
+              <a:buSzTx/>
+              <a:buFontTx/>
+              <a:buNone/>
+              <a:tabLst/>
+            </a:pPr>
+            <a:r>
+              <a:rPr kumimoji="0" lang="en-US" sz="3200" b="0" i="0" u="none" strike="noStrike" cap="none" spc="0" normalizeH="0" baseline="0" dirty="0">
+                <a:ln>
+                  <a:noFill/>
+                </a:ln>
+                <a:solidFill>
+                  <a:schemeClr val="bg1"/>
+                </a:solidFill>
+                <a:effectLst/>
+                <a:uFillTx/>
+                <a:latin typeface="+mn-lt"/>
+                <a:ea typeface="+mn-ea"/>
+                <a:cs typeface="+mn-cs"/>
+                <a:sym typeface="Calibri"/>
+              </a:rPr>
+              <a:t>@MatthewYKnowles</a:t>
+            </a:r>
+          </a:p>
+          <a:p>
+            <a:pPr marL="0" marR="0" indent="0" algn="l" defTabSz="914400" rtl="0" fontAlgn="auto" latinLnBrk="0" hangingPunct="0">
+              <a:lnSpc>
+                <a:spcPct val="100000"/>
+              </a:lnSpc>
+              <a:spcBef>
+                <a:spcPts val="0"/>
+              </a:spcBef>
+              <a:spcAft>
+                <a:spcPts val="0"/>
+              </a:spcAft>
+              <a:buClrTx/>
+              <a:buSzTx/>
+              <a:buFontTx/>
+              <a:buNone/>
+              <a:tabLst/>
+            </a:pPr>
+            <a:r>
+              <a:rPr lang="en-US" sz="3200" dirty="0">
+                <a:solidFill>
+                  <a:schemeClr val="bg1"/>
+                </a:solidFill>
+              </a:rPr>
+              <a:t>Matthew.Knowles@EmmersionLearning.com</a:t>
+            </a:r>
+            <a:endParaRPr kumimoji="0" lang="en-US" sz="3200" b="0" i="0" u="none" strike="noStrike" cap="none" spc="0" normalizeH="0" baseline="0" dirty="0">
+              <a:ln>
+                <a:noFill/>
+              </a:ln>
+              <a:solidFill>
+                <a:schemeClr val="bg1"/>
+              </a:solidFill>
+              <a:effectLst/>
+              <a:uFillTx/>
+              <a:sym typeface="Calibri"/>
+            </a:endParaRPr>
+          </a:p>
+        </p:txBody>
+      </p:sp>
+      <p:pic>
+        <p:nvPicPr>
+          <p:cNvPr id="10" name="Picture 9">
+            <a:extLst>
+              <a:ext uri="{FF2B5EF4-FFF2-40B4-BE49-F238E27FC236}">
+                <a16:creationId xmlns:a16="http://schemas.microsoft.com/office/drawing/2014/main" id="{D68A35C7-50ED-44A5-B309-DF54D58CDA9F}"/>
+              </a:ext>
+            </a:extLst>
+          </p:cNvPr>
+          <p:cNvPicPr>
+            <a:picLocks noChangeAspect="1"/>
+          </p:cNvPicPr>
+          <p:nvPr/>
+        </p:nvPicPr>
+        <p:blipFill>
+          <a:blip r:embed="rId2">
+            <a:extLst>
+              <a:ext uri="{28A0092B-C50C-407E-A947-70E740481C1C}">
+                <a14:useLocalDpi xmlns:a14="http://schemas.microsoft.com/office/drawing/2010/main" val="0"/>
+              </a:ext>
+            </a:extLst>
+          </a:blip>
+          <a:stretch>
+            <a:fillRect/>
+          </a:stretch>
+        </p:blipFill>
+        <p:spPr>
+          <a:xfrm>
+            <a:off x="8830407" y="3186917"/>
+            <a:ext cx="3288323" cy="3288323"/>
+          </a:xfrm>
+          <a:prstGeom prst="rect">
+            <a:avLst/>
+          </a:prstGeom>
+        </p:spPr>
+      </p:pic>
+      <p:sp>
+        <p:nvSpPr>
+          <p:cNvPr id="11" name="TextBox 10">
+            <a:extLst>
+              <a:ext uri="{FF2B5EF4-FFF2-40B4-BE49-F238E27FC236}">
+                <a16:creationId xmlns:a16="http://schemas.microsoft.com/office/drawing/2014/main" id="{822CE723-1F34-4656-A4E8-F77CE9945420}"/>
+              </a:ext>
+            </a:extLst>
+          </p:cNvPr>
+          <p:cNvSpPr txBox="1"/>
+          <p:nvPr/>
+        </p:nvSpPr>
+        <p:spPr>
+          <a:xfrm>
+            <a:off x="613996" y="448408"/>
+            <a:ext cx="10964007" cy="1477325"/>
+          </a:xfrm>
+          <a:prstGeom prst="rect">
+            <a:avLst/>
+          </a:prstGeom>
+          <a:noFill/>
+          <a:ln w="12700" cap="flat">
+            <a:noFill/>
+            <a:miter lim="400000"/>
+          </a:ln>
+          <a:effectLst/>
+          <a:sp3d/>
+        </p:spPr>
+        <p:style>
+          <a:lnRef idx="0">
+            <a:scrgbClr r="0" g="0" b="0"/>
+          </a:lnRef>
+          <a:fillRef idx="0">
+            <a:scrgbClr r="0" g="0" b="0"/>
+          </a:fillRef>
+          <a:effectRef idx="0">
+            <a:scrgbClr r="0" g="0" b="0"/>
+          </a:effectRef>
+          <a:fontRef idx="none"/>
+        </p:style>
+        <p:txBody>
+          <a:bodyPr rot="0" spcFirstLastPara="1" vertOverflow="overflow" horzOverflow="overflow" vert="horz" wrap="square" lIns="45719" tIns="45719" rIns="45719" bIns="45719" numCol="1" spcCol="38100" rtlCol="0" anchor="t">
+            <a:spAutoFit/>
+          </a:bodyPr>
+          <a:lstStyle/>
+          <a:p>
+            <a:pPr marL="0" marR="0" indent="0" algn="ctr" defTabSz="914400" rtl="0" fontAlgn="auto" latinLnBrk="0" hangingPunct="0">
+              <a:lnSpc>
+                <a:spcPct val="100000"/>
+              </a:lnSpc>
+              <a:spcBef>
+                <a:spcPts val="0"/>
+              </a:spcBef>
+              <a:spcAft>
+                <a:spcPts val="0"/>
+              </a:spcAft>
+              <a:buClrTx/>
+              <a:buSzTx/>
+              <a:buFontTx/>
+              <a:buNone/>
+              <a:tabLst/>
+            </a:pPr>
+            <a:r>
+              <a:rPr lang="en-US" sz="6600" dirty="0">
+                <a:solidFill>
+                  <a:schemeClr val="bg1"/>
+                </a:solidFill>
+              </a:rPr>
+              <a:t>Who Watches the Watchmen</a:t>
+            </a:r>
+          </a:p>
+          <a:p>
+            <a:pPr marL="0" marR="0" indent="0" algn="ctr" defTabSz="914400" rtl="0" fontAlgn="auto" latinLnBrk="0" hangingPunct="0">
+              <a:lnSpc>
+                <a:spcPct val="100000"/>
+              </a:lnSpc>
+              <a:spcBef>
+                <a:spcPts val="0"/>
+              </a:spcBef>
+              <a:spcAft>
+                <a:spcPts val="0"/>
+              </a:spcAft>
+              <a:buClrTx/>
+              <a:buSzTx/>
+              <a:buFontTx/>
+              <a:buNone/>
+              <a:tabLst/>
+            </a:pPr>
+            <a:r>
+              <a:rPr lang="en-US" sz="2400" dirty="0">
+                <a:solidFill>
+                  <a:schemeClr val="bg1"/>
+                </a:solidFill>
+              </a:rPr>
+              <a:t>Introducing a Better Metric of your Tests’ Quality</a:t>
+            </a:r>
+            <a:endParaRPr kumimoji="0" lang="en-US" sz="2400" b="0" i="0" u="none" strike="noStrike" cap="none" spc="0" normalizeH="0" baseline="0" dirty="0">
+              <a:ln>
+                <a:noFill/>
+              </a:ln>
+              <a:solidFill>
+                <a:schemeClr val="bg1"/>
+              </a:solidFill>
+              <a:effectLst/>
+              <a:uFillTx/>
+              <a:sym typeface="Calibri"/>
+            </a:endParaRPr>
+          </a:p>
+        </p:txBody>
+      </p:sp>
+    </p:spTree>
+    <p:extLst>
+      <p:ext uri="{BB962C8B-B14F-4D97-AF65-F5344CB8AC3E}">
+        <p14:creationId xmlns:p14="http://schemas.microsoft.com/office/powerpoint/2010/main" val="941543498"/>
+      </p:ext>
+    </p:extLst>
+  </p:cSld>
+  <p:clrMapOvr>
+    <a:masterClrMapping/>
+  </p:clrMapOvr>
+  <p:transition spd="med"/>
+</p:sld>
+</file>
+
+<file path=ppt/slides/slide20.xml><?xml version="1.0" encoding="utf-8"?>
+<p:sld xmlns:a="http://schemas.openxmlformats.org/drawingml/2006/main" xmlns:r="http://schemas.openxmlformats.org/officeDocument/2006/relationships" xmlns:p="http://schemas.openxmlformats.org/presentationml/2006/main">
+  <p:cSld>
+    <p:spTree>
+      <p:nvGrpSpPr>
+        <p:cNvPr id="1" name=""/>
+        <p:cNvGrpSpPr/>
+        <p:nvPr/>
+      </p:nvGrpSpPr>
+      <p:grpSpPr>
+        <a:xfrm>
+          <a:off x="0" y="0"/>
+          <a:ext cx="0" cy="0"/>
+          <a:chOff x="0" y="0"/>
+          <a:chExt cx="0" cy="0"/>
+        </a:xfrm>
+      </p:grpSpPr>
       <p:sp>
         <p:nvSpPr>
           <p:cNvPr id="4" name="Title 3">
@@ -5170,7 +6357,7 @@
 </p:sld>
 </file>
 
-<file path=ppt/slides/slide19.xml><?xml version="1.0" encoding="utf-8"?>
+<file path=ppt/slides/slide21.xml><?xml version="1.0" encoding="utf-8"?>
 <p:sld xmlns:a="http://schemas.openxmlformats.org/drawingml/2006/main" xmlns:r="http://schemas.openxmlformats.org/officeDocument/2006/relationships" xmlns:p="http://schemas.openxmlformats.org/presentationml/2006/main">
   <p:cSld>
     <p:spTree>
@@ -5367,7 +6554,7 @@
 </p:sld>
 </file>
 
-<file path=ppt/slides/slide2.xml><?xml version="1.0" encoding="utf-8"?>
+<file path=ppt/slides/slide22.xml><?xml version="1.0" encoding="utf-8"?>
 <p:sld xmlns:a="http://schemas.openxmlformats.org/drawingml/2006/main" xmlns:r="http://schemas.openxmlformats.org/officeDocument/2006/relationships" xmlns:p="http://schemas.openxmlformats.org/presentationml/2006/main">
   <p:cSld>
     <p:spTree>
@@ -5386,398 +6573,6 @@
       </p:grpSpPr>
       <p:sp>
         <p:nvSpPr>
-          <p:cNvPr id="7" name="TextBox 6">
-            <a:extLst>
-              <a:ext uri="{FF2B5EF4-FFF2-40B4-BE49-F238E27FC236}">
-                <a16:creationId xmlns:a16="http://schemas.microsoft.com/office/drawing/2014/main" id="{5DB3407A-9FD9-4567-9261-3C7BF4AFC736}"/>
-              </a:ext>
-            </a:extLst>
-          </p:cNvPr>
-          <p:cNvSpPr txBox="1"/>
-          <p:nvPr/>
-        </p:nvSpPr>
-        <p:spPr>
-          <a:xfrm>
-            <a:off x="685801" y="3615355"/>
-            <a:ext cx="8166657" cy="2554543"/>
-          </a:xfrm>
-          <a:prstGeom prst="rect">
-            <a:avLst/>
-          </a:prstGeom>
-          <a:noFill/>
-          <a:ln w="12700" cap="flat">
-            <a:noFill/>
-            <a:miter lim="400000"/>
-          </a:ln>
-          <a:effectLst/>
-          <a:sp3d/>
-        </p:spPr>
-        <p:style>
-          <a:lnRef idx="0">
-            <a:scrgbClr r="0" g="0" b="0"/>
-          </a:lnRef>
-          <a:fillRef idx="0">
-            <a:scrgbClr r="0" g="0" b="0"/>
-          </a:fillRef>
-          <a:effectRef idx="0">
-            <a:scrgbClr r="0" g="0" b="0"/>
-          </a:effectRef>
-          <a:fontRef idx="none"/>
-        </p:style>
-        <p:txBody>
-          <a:bodyPr rot="0" spcFirstLastPara="1" vertOverflow="overflow" horzOverflow="overflow" vert="horz" wrap="none" lIns="45719" tIns="45719" rIns="45719" bIns="45719" numCol="1" spcCol="38100" rtlCol="0" anchor="t">
-            <a:spAutoFit/>
-          </a:bodyPr>
-          <a:lstStyle/>
-          <a:p>
-            <a:pPr marL="0" marR="0" indent="0" algn="l" defTabSz="914400" rtl="0" fontAlgn="auto" latinLnBrk="0" hangingPunct="0">
-              <a:lnSpc>
-                <a:spcPct val="100000"/>
-              </a:lnSpc>
-              <a:spcBef>
-                <a:spcPts val="0"/>
-              </a:spcBef>
-              <a:spcAft>
-                <a:spcPts val="0"/>
-              </a:spcAft>
-              <a:buClrTx/>
-              <a:buSzTx/>
-              <a:buFontTx/>
-              <a:buNone/>
-              <a:tabLst/>
-            </a:pPr>
-            <a:r>
-              <a:rPr kumimoji="0" lang="en-US" sz="3200" b="0" i="0" u="none" strike="noStrike" cap="none" spc="0" normalizeH="0" baseline="0" dirty="0">
-                <a:ln>
-                  <a:noFill/>
-                </a:ln>
-                <a:solidFill>
-                  <a:schemeClr val="bg1"/>
-                </a:solidFill>
-                <a:effectLst/>
-                <a:uFillTx/>
-                <a:latin typeface="+mn-lt"/>
-                <a:ea typeface="+mn-ea"/>
-                <a:cs typeface="+mn-cs"/>
-                <a:sym typeface="Calibri"/>
-              </a:rPr>
-              <a:t>Matthew Knowles</a:t>
-            </a:r>
-          </a:p>
-          <a:p>
-            <a:pPr marL="0" marR="0" indent="0" algn="l" defTabSz="914400" rtl="0" fontAlgn="auto" latinLnBrk="0" hangingPunct="0">
-              <a:lnSpc>
-                <a:spcPct val="100000"/>
-              </a:lnSpc>
-              <a:spcBef>
-                <a:spcPts val="0"/>
-              </a:spcBef>
-              <a:spcAft>
-                <a:spcPts val="0"/>
-              </a:spcAft>
-              <a:buClrTx/>
-              <a:buSzTx/>
-              <a:buFontTx/>
-              <a:buNone/>
-              <a:tabLst/>
-            </a:pPr>
-            <a:r>
-              <a:rPr lang="en-US" sz="3200" dirty="0">
-                <a:solidFill>
-                  <a:schemeClr val="bg1"/>
-                </a:solidFill>
-              </a:rPr>
-              <a:t>Software Craftsman at Emmersion Learning</a:t>
-            </a:r>
-          </a:p>
-          <a:p>
-            <a:pPr marL="0" marR="0" indent="0" algn="l" defTabSz="914400" rtl="0" fontAlgn="auto" latinLnBrk="0" hangingPunct="0">
-              <a:lnSpc>
-                <a:spcPct val="100000"/>
-              </a:lnSpc>
-              <a:spcBef>
-                <a:spcPts val="0"/>
-              </a:spcBef>
-              <a:spcAft>
-                <a:spcPts val="0"/>
-              </a:spcAft>
-              <a:buClrTx/>
-              <a:buSzTx/>
-              <a:buFontTx/>
-              <a:buNone/>
-              <a:tabLst/>
-            </a:pPr>
-            <a:r>
-              <a:rPr kumimoji="0" lang="en-US" sz="3200" b="0" i="0" u="none" strike="noStrike" cap="none" spc="0" normalizeH="0" baseline="0" dirty="0">
-                <a:ln>
-                  <a:noFill/>
-                </a:ln>
-                <a:solidFill>
-                  <a:schemeClr val="bg1"/>
-                </a:solidFill>
-                <a:effectLst/>
-                <a:uFillTx/>
-                <a:latin typeface="+mn-lt"/>
-                <a:ea typeface="+mn-ea"/>
-                <a:cs typeface="+mn-cs"/>
-                <a:sym typeface="Calibri"/>
-              </a:rPr>
-              <a:t>www.EmmersionLearning.com</a:t>
-            </a:r>
-          </a:p>
-          <a:p>
-            <a:pPr marL="0" marR="0" indent="0" algn="l" defTabSz="914400" rtl="0" fontAlgn="auto" latinLnBrk="0" hangingPunct="0">
-              <a:lnSpc>
-                <a:spcPct val="100000"/>
-              </a:lnSpc>
-              <a:spcBef>
-                <a:spcPts val="0"/>
-              </a:spcBef>
-              <a:spcAft>
-                <a:spcPts val="0"/>
-              </a:spcAft>
-              <a:buClrTx/>
-              <a:buSzTx/>
-              <a:buFontTx/>
-              <a:buNone/>
-              <a:tabLst/>
-            </a:pPr>
-            <a:r>
-              <a:rPr kumimoji="0" lang="en-US" sz="3200" b="0" i="0" u="none" strike="noStrike" cap="none" spc="0" normalizeH="0" baseline="0" dirty="0">
-                <a:ln>
-                  <a:noFill/>
-                </a:ln>
-                <a:solidFill>
-                  <a:schemeClr val="bg1"/>
-                </a:solidFill>
-                <a:effectLst/>
-                <a:uFillTx/>
-                <a:latin typeface="+mn-lt"/>
-                <a:ea typeface="+mn-ea"/>
-                <a:cs typeface="+mn-cs"/>
-                <a:sym typeface="Calibri"/>
-              </a:rPr>
-              <a:t>@MatthewYKnowles</a:t>
-            </a:r>
-          </a:p>
-          <a:p>
-            <a:pPr marL="0" marR="0" indent="0" algn="l" defTabSz="914400" rtl="0" fontAlgn="auto" latinLnBrk="0" hangingPunct="0">
-              <a:lnSpc>
-                <a:spcPct val="100000"/>
-              </a:lnSpc>
-              <a:spcBef>
-                <a:spcPts val="0"/>
-              </a:spcBef>
-              <a:spcAft>
-                <a:spcPts val="0"/>
-              </a:spcAft>
-              <a:buClrTx/>
-              <a:buSzTx/>
-              <a:buFontTx/>
-              <a:buNone/>
-              <a:tabLst/>
-            </a:pPr>
-            <a:r>
-              <a:rPr lang="en-US" sz="3200" dirty="0">
-                <a:solidFill>
-                  <a:schemeClr val="bg1"/>
-                </a:solidFill>
-              </a:rPr>
-              <a:t>Matthew.Knowles@EmmersionLearning.com</a:t>
-            </a:r>
-            <a:endParaRPr kumimoji="0" lang="en-US" sz="3200" b="0" i="0" u="none" strike="noStrike" cap="none" spc="0" normalizeH="0" baseline="0" dirty="0">
-              <a:ln>
-                <a:noFill/>
-              </a:ln>
-              <a:solidFill>
-                <a:schemeClr val="bg1"/>
-              </a:solidFill>
-              <a:effectLst/>
-              <a:uFillTx/>
-              <a:sym typeface="Calibri"/>
-            </a:endParaRPr>
-          </a:p>
-        </p:txBody>
-      </p:sp>
-      <p:pic>
-        <p:nvPicPr>
-          <p:cNvPr id="10" name="Picture 9">
-            <a:extLst>
-              <a:ext uri="{FF2B5EF4-FFF2-40B4-BE49-F238E27FC236}">
-                <a16:creationId xmlns:a16="http://schemas.microsoft.com/office/drawing/2014/main" id="{D68A35C7-50ED-44A5-B309-DF54D58CDA9F}"/>
-              </a:ext>
-            </a:extLst>
-          </p:cNvPr>
-          <p:cNvPicPr>
-            <a:picLocks noChangeAspect="1"/>
-          </p:cNvPicPr>
-          <p:nvPr/>
-        </p:nvPicPr>
-        <p:blipFill>
-          <a:blip r:embed="rId2">
-            <a:extLst>
-              <a:ext uri="{28A0092B-C50C-407E-A947-70E740481C1C}">
-                <a14:useLocalDpi xmlns:a14="http://schemas.microsoft.com/office/drawing/2010/main" val="0"/>
-              </a:ext>
-            </a:extLst>
-          </a:blip>
-          <a:stretch>
-            <a:fillRect/>
-          </a:stretch>
-        </p:blipFill>
-        <p:spPr>
-          <a:xfrm>
-            <a:off x="8830407" y="3186917"/>
-            <a:ext cx="3288323" cy="3288323"/>
-          </a:xfrm>
-          <a:prstGeom prst="rect">
-            <a:avLst/>
-          </a:prstGeom>
-        </p:spPr>
-      </p:pic>
-      <p:sp>
-        <p:nvSpPr>
-          <p:cNvPr id="11" name="TextBox 10">
-            <a:extLst>
-              <a:ext uri="{FF2B5EF4-FFF2-40B4-BE49-F238E27FC236}">
-                <a16:creationId xmlns:a16="http://schemas.microsoft.com/office/drawing/2014/main" id="{822CE723-1F34-4656-A4E8-F77CE9945420}"/>
-              </a:ext>
-            </a:extLst>
-          </p:cNvPr>
-          <p:cNvSpPr txBox="1"/>
-          <p:nvPr/>
-        </p:nvSpPr>
-        <p:spPr>
-          <a:xfrm>
-            <a:off x="613996" y="448408"/>
-            <a:ext cx="10964007" cy="1477325"/>
-          </a:xfrm>
-          <a:prstGeom prst="rect">
-            <a:avLst/>
-          </a:prstGeom>
-          <a:noFill/>
-          <a:ln w="12700" cap="flat">
-            <a:noFill/>
-            <a:miter lim="400000"/>
-          </a:ln>
-          <a:effectLst/>
-          <a:sp3d/>
-        </p:spPr>
-        <p:style>
-          <a:lnRef idx="0">
-            <a:scrgbClr r="0" g="0" b="0"/>
-          </a:lnRef>
-          <a:fillRef idx="0">
-            <a:scrgbClr r="0" g="0" b="0"/>
-          </a:fillRef>
-          <a:effectRef idx="0">
-            <a:scrgbClr r="0" g="0" b="0"/>
-          </a:effectRef>
-          <a:fontRef idx="none"/>
-        </p:style>
-        <p:txBody>
-          <a:bodyPr rot="0" spcFirstLastPara="1" vertOverflow="overflow" horzOverflow="overflow" vert="horz" wrap="square" lIns="45719" tIns="45719" rIns="45719" bIns="45719" numCol="1" spcCol="38100" rtlCol="0" anchor="t">
-            <a:spAutoFit/>
-          </a:bodyPr>
-          <a:lstStyle/>
-          <a:p>
-            <a:pPr marL="0" marR="0" indent="0" algn="ctr" defTabSz="914400" rtl="0" fontAlgn="auto" latinLnBrk="0" hangingPunct="0">
-              <a:lnSpc>
-                <a:spcPct val="100000"/>
-              </a:lnSpc>
-              <a:spcBef>
-                <a:spcPts val="0"/>
-              </a:spcBef>
-              <a:spcAft>
-                <a:spcPts val="0"/>
-              </a:spcAft>
-              <a:buClrTx/>
-              <a:buSzTx/>
-              <a:buFontTx/>
-              <a:buNone/>
-              <a:tabLst/>
-            </a:pPr>
-            <a:r>
-              <a:rPr lang="en-US" sz="6600" dirty="0">
-                <a:solidFill>
-                  <a:schemeClr val="bg1"/>
-                </a:solidFill>
-              </a:rPr>
-              <a:t>Who Watches the Watchmen</a:t>
-            </a:r>
-          </a:p>
-          <a:p>
-            <a:pPr marL="0" marR="0" indent="0" algn="ctr" defTabSz="914400" rtl="0" fontAlgn="auto" latinLnBrk="0" hangingPunct="0">
-              <a:lnSpc>
-                <a:spcPct val="100000"/>
-              </a:lnSpc>
-              <a:spcBef>
-                <a:spcPts val="0"/>
-              </a:spcBef>
-              <a:spcAft>
-                <a:spcPts val="0"/>
-              </a:spcAft>
-              <a:buClrTx/>
-              <a:buSzTx/>
-              <a:buFontTx/>
-              <a:buNone/>
-              <a:tabLst/>
-            </a:pPr>
-            <a:r>
-              <a:rPr lang="en-US" sz="2400" dirty="0">
-                <a:solidFill>
-                  <a:schemeClr val="bg1"/>
-                </a:solidFill>
-              </a:rPr>
-              <a:t>Introducing a Better Metric of your Tests’ Quality</a:t>
-            </a:r>
-            <a:endParaRPr kumimoji="0" lang="en-US" sz="2400" b="0" i="0" u="none" strike="noStrike" cap="none" spc="0" normalizeH="0" baseline="0" dirty="0">
-              <a:ln>
-                <a:noFill/>
-              </a:ln>
-              <a:solidFill>
-                <a:schemeClr val="bg1"/>
-              </a:solidFill>
-              <a:effectLst/>
-              <a:uFillTx/>
-              <a:sym typeface="Calibri"/>
-            </a:endParaRPr>
-          </a:p>
-        </p:txBody>
-      </p:sp>
-    </p:spTree>
-    <p:extLst>
-      <p:ext uri="{BB962C8B-B14F-4D97-AF65-F5344CB8AC3E}">
-        <p14:creationId xmlns:p14="http://schemas.microsoft.com/office/powerpoint/2010/main" val="941543498"/>
-      </p:ext>
-    </p:extLst>
-  </p:cSld>
-  <p:clrMapOvr>
-    <a:masterClrMapping/>
-  </p:clrMapOvr>
-  <p:transition spd="med"/>
-</p:sld>
-</file>
-
-<file path=ppt/slides/slide20.xml><?xml version="1.0" encoding="utf-8"?>
-<p:sld xmlns:a="http://schemas.openxmlformats.org/drawingml/2006/main" xmlns:r="http://schemas.openxmlformats.org/officeDocument/2006/relationships" xmlns:p="http://schemas.openxmlformats.org/presentationml/2006/main">
-  <p:cSld>
-    <p:spTree>
-      <p:nvGrpSpPr>
-        <p:cNvPr id="1" name=""/>
-        <p:cNvGrpSpPr/>
-        <p:nvPr/>
-      </p:nvGrpSpPr>
-      <p:grpSpPr>
-        <a:xfrm>
-          <a:off x="0" y="0"/>
-          <a:ext cx="0" cy="0"/>
-          <a:chOff x="0" y="0"/>
-          <a:chExt cx="0" cy="0"/>
-        </a:xfrm>
-      </p:grpSpPr>
-      <p:sp>
-        <p:nvSpPr>
           <p:cNvPr id="5" name="Title 1">
             <a:extLst>
               <a:ext uri="{FF2B5EF4-FFF2-40B4-BE49-F238E27FC236}">
@@ -5927,7 +6722,7 @@
 </p:sld>
 </file>
 
-<file path=ppt/slides/slide21.xml><?xml version="1.0" encoding="utf-8"?>
+<file path=ppt/slides/slide23.xml><?xml version="1.0" encoding="utf-8"?>
 <p:sld xmlns:a="http://schemas.openxmlformats.org/drawingml/2006/main" xmlns:r="http://schemas.openxmlformats.org/officeDocument/2006/relationships" xmlns:p="http://schemas.openxmlformats.org/presentationml/2006/main">
   <p:cSld>
     <p:spTree>

</xml_diff>